<commit_message>
Variati i colori nel powerpoint
Invece di utilizzare un colore solido, si è utilizzato un gradiente. Tale gradiente è tratto dal logo di forma.lms (il più fedelmente possibile)
</commit_message>
<xml_diff>
--- a/presentazione-formalms.pptx
+++ b/presentazione-formalms.pptx
@@ -144,6 +144,9 @@
           </p14:sldIdLst>
         </p14:section>
       </p14:sectionLst>
+    </p:ext>
+    <p:ext uri="{EFAFB233-063F-42B5-8137-9DF3F51BA10A}">
+      <p15:sldGuideLst xmlns:p15="http://schemas.microsoft.com/office/powerpoint/2012/main"/>
     </p:ext>
   </p:extLst>
 </p:presentation>
@@ -3800,9 +3803,17 @@
   <p:cSld name="Diapositiva titolo">
     <p:bg>
       <p:bgPr>
-        <a:solidFill>
-          <a:srgbClr val="E73E1B"/>
-        </a:solidFill>
+        <a:gradFill>
+          <a:gsLst>
+            <a:gs pos="32000">
+              <a:srgbClr val="E73E1B"/>
+            </a:gs>
+            <a:gs pos="100000">
+              <a:srgbClr val="EB6D06"/>
+            </a:gs>
+          </a:gsLst>
+          <a:lin ang="2700000" scaled="0"/>
+        </a:gradFill>
         <a:effectLst/>
       </p:bgPr>
     </p:bg>
@@ -4573,9 +4584,18 @@
               <a:gd name="adj" fmla="val 50000"/>
             </a:avLst>
           </a:prstGeom>
-          <a:solidFill>
-            <a:srgbClr val="E73E1B"/>
-          </a:solidFill>
+          <a:gradFill flip="none" rotWithShape="1">
+            <a:gsLst>
+              <a:gs pos="32000">
+                <a:srgbClr val="E73E1B"/>
+              </a:gs>
+              <a:gs pos="100000">
+                <a:srgbClr val="EB6D06"/>
+              </a:gs>
+            </a:gsLst>
+            <a:lin ang="8100000" scaled="1"/>
+            <a:tileRect/>
+          </a:gradFill>
           <a:ln>
             <a:noFill/>
           </a:ln>
@@ -4752,9 +4772,18 @@
               <a:gd name="adj" fmla="val 50000"/>
             </a:avLst>
           </a:prstGeom>
-          <a:solidFill>
-            <a:srgbClr val="E73E1B"/>
-          </a:solidFill>
+          <a:gradFill flip="none" rotWithShape="1">
+            <a:gsLst>
+              <a:gs pos="32000">
+                <a:srgbClr val="E73E1B"/>
+              </a:gs>
+              <a:gs pos="100000">
+                <a:srgbClr val="EB6D06"/>
+              </a:gs>
+            </a:gsLst>
+            <a:lin ang="18900000" scaled="1"/>
+            <a:tileRect/>
+          </a:gradFill>
           <a:ln>
             <a:noFill/>
           </a:ln>
@@ -4843,9 +4872,17 @@
   <p:cSld name="Intestazione sezione">
     <p:bg>
       <p:bgPr>
-        <a:solidFill>
-          <a:srgbClr val="E73E1B"/>
-        </a:solidFill>
+        <a:gradFill>
+          <a:gsLst>
+            <a:gs pos="32000">
+              <a:srgbClr val="E73E1B"/>
+            </a:gs>
+            <a:gs pos="100000">
+              <a:srgbClr val="EB6D06"/>
+            </a:gs>
+          </a:gsLst>
+          <a:lin ang="2700000" scaled="0"/>
+        </a:gradFill>
         <a:effectLst/>
       </p:bgPr>
     </p:bg>
@@ -7397,9 +7434,17 @@
   <p:cSld>
     <p:bg>
       <p:bgPr>
-        <a:solidFill>
-          <a:srgbClr val="E73E1B"/>
-        </a:solidFill>
+        <a:gradFill>
+          <a:gsLst>
+            <a:gs pos="32000">
+              <a:srgbClr val="E73E1B"/>
+            </a:gs>
+            <a:gs pos="100000">
+              <a:srgbClr val="EB6D06"/>
+            </a:gs>
+          </a:gsLst>
+          <a:lin ang="2700000" scaled="0"/>
+        </a:gradFill>
         <a:effectLst/>
       </p:bgPr>
     </p:bg>
@@ -7718,13 +7763,13 @@
   <p:clrMapOvr>
     <a:masterClrMapping/>
   </p:clrMapOvr>
-  <mc:AlternateContent xmlns:mc="http://schemas.openxmlformats.org/markup-compatibility/2006">
-    <mc:Choice xmlns:p159="http://schemas.microsoft.com/office/powerpoint/2015/09/main" Requires="p159">
+  <mc:AlternateContent xmlns:mc="http://schemas.openxmlformats.org/markup-compatibility/2006" xmlns:p159="http://schemas.microsoft.com/office/powerpoint/2015/09/main">
+    <mc:Choice Requires="p159">
       <p:transition xmlns:p14="http://schemas.microsoft.com/office/powerpoint/2010/main" spd="slow" p14:dur="2000">
         <p159:morph option="byObject"/>
       </p:transition>
     </mc:Choice>
-    <mc:Fallback>
+    <mc:Fallback xmlns="">
       <p:transition spd="slow">
         <p:fade/>
       </p:transition>
@@ -8074,13 +8119,13 @@
   <p:clrMapOvr>
     <a:masterClrMapping/>
   </p:clrMapOvr>
-  <mc:AlternateContent xmlns:mc="http://schemas.openxmlformats.org/markup-compatibility/2006">
-    <mc:Choice xmlns:p159="http://schemas.microsoft.com/office/powerpoint/2015/09/main" Requires="p159">
+  <mc:AlternateContent xmlns:mc="http://schemas.openxmlformats.org/markup-compatibility/2006" xmlns:p159="http://schemas.microsoft.com/office/powerpoint/2015/09/main">
+    <mc:Choice Requires="p159">
       <p:transition xmlns:p14="http://schemas.microsoft.com/office/powerpoint/2010/main" spd="slow" p14:dur="2000">
         <p159:morph option="byObject"/>
       </p:transition>
     </mc:Choice>
-    <mc:Fallback>
+    <mc:Fallback xmlns="">
       <p:transition spd="slow">
         <p:fade/>
       </p:transition>
@@ -8205,13 +8250,13 @@
   <p:clrMapOvr>
     <a:masterClrMapping/>
   </p:clrMapOvr>
-  <mc:AlternateContent xmlns:mc="http://schemas.openxmlformats.org/markup-compatibility/2006">
-    <mc:Choice xmlns:p159="http://schemas.microsoft.com/office/powerpoint/2015/09/main" Requires="p159">
+  <mc:AlternateContent xmlns:mc="http://schemas.openxmlformats.org/markup-compatibility/2006" xmlns:p159="http://schemas.microsoft.com/office/powerpoint/2015/09/main">
+    <mc:Choice Requires="p159">
       <p:transition xmlns:p14="http://schemas.microsoft.com/office/powerpoint/2010/main" spd="slow" p14:dur="2000">
         <p159:morph option="byObject"/>
       </p:transition>
     </mc:Choice>
-    <mc:Fallback>
+    <mc:Fallback xmlns="">
       <p:transition spd="slow">
         <p:fade/>
       </p:transition>
@@ -8400,13 +8445,13 @@
   <p:clrMapOvr>
     <a:masterClrMapping/>
   </p:clrMapOvr>
-  <mc:AlternateContent xmlns:mc="http://schemas.openxmlformats.org/markup-compatibility/2006">
-    <mc:Choice xmlns:p159="http://schemas.microsoft.com/office/powerpoint/2015/09/main" Requires="p159">
+  <mc:AlternateContent xmlns:mc="http://schemas.openxmlformats.org/markup-compatibility/2006" xmlns:p159="http://schemas.microsoft.com/office/powerpoint/2015/09/main">
+    <mc:Choice Requires="p159">
       <p:transition xmlns:p14="http://schemas.microsoft.com/office/powerpoint/2010/main" spd="slow" p14:dur="2000">
         <p159:morph option="byObject"/>
       </p:transition>
     </mc:Choice>
-    <mc:Fallback>
+    <mc:Fallback xmlns="">
       <p:transition spd="slow">
         <p:fade/>
       </p:transition>
@@ -8536,13 +8581,13 @@
   <p:clrMapOvr>
     <a:masterClrMapping/>
   </p:clrMapOvr>
-  <mc:AlternateContent xmlns:mc="http://schemas.openxmlformats.org/markup-compatibility/2006">
-    <mc:Choice xmlns:p159="http://schemas.microsoft.com/office/powerpoint/2015/09/main" Requires="p159">
+  <mc:AlternateContent xmlns:mc="http://schemas.openxmlformats.org/markup-compatibility/2006" xmlns:p159="http://schemas.microsoft.com/office/powerpoint/2015/09/main">
+    <mc:Choice Requires="p159">
       <p:transition xmlns:p14="http://schemas.microsoft.com/office/powerpoint/2010/main" spd="slow" p14:dur="2000">
         <p159:morph option="byObject"/>
       </p:transition>
     </mc:Choice>
-    <mc:Fallback>
+    <mc:Fallback xmlns="">
       <p:transition spd="slow">
         <p:fade/>
       </p:transition>
@@ -8668,13 +8713,13 @@
   <p:clrMapOvr>
     <a:masterClrMapping/>
   </p:clrMapOvr>
-  <mc:AlternateContent xmlns:mc="http://schemas.openxmlformats.org/markup-compatibility/2006">
-    <mc:Choice xmlns:p159="http://schemas.microsoft.com/office/powerpoint/2015/09/main" Requires="p159">
+  <mc:AlternateContent xmlns:mc="http://schemas.openxmlformats.org/markup-compatibility/2006" xmlns:p159="http://schemas.microsoft.com/office/powerpoint/2015/09/main">
+    <mc:Choice Requires="p159">
       <p:transition xmlns:p14="http://schemas.microsoft.com/office/powerpoint/2010/main" spd="slow" p14:dur="2000">
         <p159:morph option="byObject"/>
       </p:transition>
     </mc:Choice>
-    <mc:Fallback>
+    <mc:Fallback xmlns="">
       <p:transition spd="slow">
         <p:fade/>
       </p:transition>
@@ -9010,13 +9055,13 @@
   <p:clrMapOvr>
     <a:masterClrMapping/>
   </p:clrMapOvr>
-  <mc:AlternateContent xmlns:mc="http://schemas.openxmlformats.org/markup-compatibility/2006">
-    <mc:Choice xmlns:p159="http://schemas.microsoft.com/office/powerpoint/2015/09/main" Requires="p159">
+  <mc:AlternateContent xmlns:mc="http://schemas.openxmlformats.org/markup-compatibility/2006" xmlns:p159="http://schemas.microsoft.com/office/powerpoint/2015/09/main">
+    <mc:Choice Requires="p159">
       <p:transition xmlns:p14="http://schemas.microsoft.com/office/powerpoint/2010/main" spd="slow" p14:dur="2000">
         <p159:morph option="byObject"/>
       </p:transition>
     </mc:Choice>
-    <mc:Fallback>
+    <mc:Fallback xmlns="">
       <p:transition spd="slow">
         <p:fade/>
       </p:transition>
@@ -9355,13 +9400,13 @@
   <p:clrMapOvr>
     <a:masterClrMapping/>
   </p:clrMapOvr>
-  <mc:AlternateContent xmlns:mc="http://schemas.openxmlformats.org/markup-compatibility/2006">
-    <mc:Choice xmlns:p159="http://schemas.microsoft.com/office/powerpoint/2015/09/main" Requires="p159">
+  <mc:AlternateContent xmlns:mc="http://schemas.openxmlformats.org/markup-compatibility/2006" xmlns:p159="http://schemas.microsoft.com/office/powerpoint/2015/09/main">
+    <mc:Choice Requires="p159">
       <p:transition xmlns:p14="http://schemas.microsoft.com/office/powerpoint/2010/main" spd="slow" p14:dur="2000">
         <p159:morph option="byObject"/>
       </p:transition>
     </mc:Choice>
-    <mc:Fallback>
+    <mc:Fallback xmlns="">
       <p:transition spd="slow">
         <p:fade/>
       </p:transition>
@@ -9688,13 +9733,13 @@
   <p:clrMapOvr>
     <a:masterClrMapping/>
   </p:clrMapOvr>
-  <mc:AlternateContent xmlns:mc="http://schemas.openxmlformats.org/markup-compatibility/2006">
-    <mc:Choice xmlns:p159="http://schemas.microsoft.com/office/powerpoint/2015/09/main" Requires="p159">
+  <mc:AlternateContent xmlns:mc="http://schemas.openxmlformats.org/markup-compatibility/2006" xmlns:p159="http://schemas.microsoft.com/office/powerpoint/2015/09/main">
+    <mc:Choice Requires="p159">
       <p:transition xmlns:p14="http://schemas.microsoft.com/office/powerpoint/2010/main" spd="slow" p14:dur="2000">
         <p159:morph option="byObject"/>
       </p:transition>
     </mc:Choice>
-    <mc:Fallback>
+    <mc:Fallback xmlns="">
       <p:transition spd="slow">
         <p:fade/>
       </p:transition>
@@ -10027,13 +10072,13 @@
   <p:clrMapOvr>
     <a:masterClrMapping/>
   </p:clrMapOvr>
-  <mc:AlternateContent xmlns:mc="http://schemas.openxmlformats.org/markup-compatibility/2006">
-    <mc:Choice xmlns:p159="http://schemas.microsoft.com/office/powerpoint/2015/09/main" Requires="p159">
+  <mc:AlternateContent xmlns:mc="http://schemas.openxmlformats.org/markup-compatibility/2006" xmlns:p159="http://schemas.microsoft.com/office/powerpoint/2015/09/main">
+    <mc:Choice Requires="p159">
       <p:transition xmlns:p14="http://schemas.microsoft.com/office/powerpoint/2010/main" spd="slow" p14:dur="2000">
         <p159:morph option="byObject"/>
       </p:transition>
     </mc:Choice>
-    <mc:Fallback>
+    <mc:Fallback xmlns="">
       <p:transition spd="slow">
         <p:fade/>
       </p:transition>
@@ -10366,13 +10411,13 @@
   <p:clrMapOvr>
     <a:masterClrMapping/>
   </p:clrMapOvr>
-  <mc:AlternateContent xmlns:mc="http://schemas.openxmlformats.org/markup-compatibility/2006">
-    <mc:Choice xmlns:p159="http://schemas.microsoft.com/office/powerpoint/2015/09/main" Requires="p159">
+  <mc:AlternateContent xmlns:mc="http://schemas.openxmlformats.org/markup-compatibility/2006" xmlns:p159="http://schemas.microsoft.com/office/powerpoint/2015/09/main">
+    <mc:Choice Requires="p159">
       <p:transition xmlns:p14="http://schemas.microsoft.com/office/powerpoint/2010/main" spd="slow" p14:dur="2000">
         <p159:morph option="byObject"/>
       </p:transition>
     </mc:Choice>
-    <mc:Fallback>
+    <mc:Fallback xmlns="">
       <p:transition spd="slow">
         <p:fade/>
       </p:transition>

</xml_diff>